<commit_message>
add doc de apresentacao
</commit_message>
<xml_diff>
--- a/docs/DOJO PPMS.pptx
+++ b/docs/DOJO PPMS.pptx
@@ -16,7 +16,8 @@
     <p:sldId id="262" r:id="rId10"/>
     <p:sldId id="263" r:id="rId11"/>
     <p:sldId id="264" r:id="rId12"/>
-    <p:sldId id="267" r:id="rId13"/>
+    <p:sldId id="268" r:id="rId13"/>
+    <p:sldId id="267" r:id="rId14"/>
   </p:sldIdLst>
   <p:sldSz cx="12192000" cy="6858000"/>
   <p:notesSz cx="6858000" cy="9144000"/>
@@ -115,6 +116,11 @@
       </a:defRPr>
     </a:lvl9pPr>
   </p:defaultTextStyle>
+  <p:extLst>
+    <p:ext uri="{EFAFB233-063F-42B5-8137-9DF3F51BA10A}">
+      <p15:sldGuideLst xmlns:p15="http://schemas.microsoft.com/office/powerpoint/2012/main"/>
+    </p:ext>
+  </p:extLst>
 </p:presentation>
 </file>
 
@@ -3265,7 +3271,7 @@
         </p:nvSpPr>
         <p:spPr>
           <a:xfrm>
-            <a:off x="1600200" y="859536"/>
+            <a:off x="1600200" y="1783080"/>
             <a:ext cx="8991600" cy="1645920"/>
           </a:xfrm>
         </p:spPr>
@@ -4038,6 +4044,790 @@
 </file>
 
 <file path=ppt/slides/slide12.xml><?xml version="1.0" encoding="utf-8"?>
+<p:sld xmlns:a="http://schemas.openxmlformats.org/drawingml/2006/main" xmlns:r="http://schemas.openxmlformats.org/officeDocument/2006/relationships" xmlns:p="http://schemas.openxmlformats.org/presentationml/2006/main">
+  <p:cSld>
+    <p:bg>
+      <p:bgPr>
+        <a:solidFill>
+          <a:schemeClr val="bg2"/>
+        </a:solidFill>
+        <a:effectLst/>
+      </p:bgPr>
+    </p:bg>
+    <p:spTree>
+      <p:nvGrpSpPr>
+        <p:cNvPr id="1" name=""/>
+        <p:cNvGrpSpPr/>
+        <p:nvPr/>
+      </p:nvGrpSpPr>
+      <p:grpSpPr>
+        <a:xfrm>
+          <a:off x="0" y="0"/>
+          <a:ext cx="0" cy="0"/>
+          <a:chOff x="0" y="0"/>
+          <a:chExt cx="0" cy="0"/>
+        </a:xfrm>
+      </p:grpSpPr>
+      <p:sp>
+        <p:nvSpPr>
+          <p:cNvPr id="27" name="Rectangle 26">
+            <a:extLst>
+              <a:ext uri="{FF2B5EF4-FFF2-40B4-BE49-F238E27FC236}">
+                <a16:creationId xmlns:a16="http://schemas.microsoft.com/office/drawing/2014/main" id="{7A816DFB-8B0F-47B3-BC12-7B9F59B4EC58}"/>
+              </a:ext>
+              <a:ext uri="{C183D7F6-B498-43B3-948B-1728B52AA6E4}">
+                <adec:decorative xmlns:adec="http://schemas.microsoft.com/office/drawing/2017/decorative" val="1"/>
+              </a:ext>
+            </a:extLst>
+          </p:cNvPr>
+          <p:cNvSpPr>
+            <a:spLocks noGrp="1" noRot="1" noChangeAspect="1" noMove="1" noResize="1" noEditPoints="1" noAdjustHandles="1" noChangeArrowheads="1" noChangeShapeType="1" noTextEdit="1"/>
+          </p:cNvSpPr>
+          <p:nvPr>
+            <p:extLst>
+              <p:ext uri="{386F3935-93C4-4BCD-93E2-E3B085C9AB24}">
+                <p16:designElem xmlns:p16="http://schemas.microsoft.com/office/powerpoint/2015/main" val="1"/>
+              </p:ext>
+            </p:extLst>
+          </p:nvPr>
+        </p:nvSpPr>
+        <p:spPr>
+          <a:xfrm>
+            <a:off x="0" y="-2"/>
+            <a:ext cx="6072915" cy="6858002"/>
+          </a:xfrm>
+          <a:prstGeom prst="rect">
+            <a:avLst/>
+          </a:prstGeom>
+          <a:solidFill>
+            <a:schemeClr val="accent2"/>
+          </a:solidFill>
+          <a:ln>
+            <a:noFill/>
+          </a:ln>
+        </p:spPr>
+        <p:style>
+          <a:lnRef idx="2">
+            <a:schemeClr val="accent1">
+              <a:shade val="50000"/>
+            </a:schemeClr>
+          </a:lnRef>
+          <a:fillRef idx="1">
+            <a:schemeClr val="accent1"/>
+          </a:fillRef>
+          <a:effectRef idx="0">
+            <a:schemeClr val="accent1"/>
+          </a:effectRef>
+          <a:fontRef idx="minor">
+            <a:schemeClr val="lt1"/>
+          </a:fontRef>
+        </p:style>
+        <p:txBody>
+          <a:bodyPr rtlCol="0" anchor="ctr"/>
+          <a:lstStyle/>
+          <a:p>
+            <a:pPr algn="ctr"/>
+            <a:endParaRPr lang="en-US"/>
+          </a:p>
+        </p:txBody>
+      </p:sp>
+      <p:sp>
+        <p:nvSpPr>
+          <p:cNvPr id="2" name="Título 1">
+            <a:extLst>
+              <a:ext uri="{FF2B5EF4-FFF2-40B4-BE49-F238E27FC236}">
+                <a16:creationId xmlns:a16="http://schemas.microsoft.com/office/drawing/2014/main" id="{93C50B7A-89F7-4EDA-9A17-DC163360DDA0}"/>
+              </a:ext>
+            </a:extLst>
+          </p:cNvPr>
+          <p:cNvSpPr>
+            <a:spLocks noGrp="1"/>
+          </p:cNvSpPr>
+          <p:nvPr>
+            <p:ph type="ctrTitle"/>
+          </p:nvPr>
+        </p:nvSpPr>
+        <p:spPr>
+          <a:xfrm>
+            <a:off x="804672" y="1290025"/>
+            <a:ext cx="4475892" cy="1188720"/>
+          </a:xfrm>
+          <a:solidFill>
+            <a:srgbClr val="FFFFFF"/>
+          </a:solidFill>
+          <a:ln>
+            <a:solidFill>
+              <a:srgbClr val="404040"/>
+            </a:solidFill>
+          </a:ln>
+        </p:spPr>
+        <p:txBody>
+          <a:bodyPr vert="horz" lIns="182880" tIns="182880" rIns="182880" bIns="182880" rtlCol="0" anchor="ctr">
+            <a:normAutofit/>
+          </a:bodyPr>
+          <a:lstStyle/>
+          <a:p>
+            <a:r>
+              <a:rPr lang="en-US" sz="2800" dirty="0" err="1"/>
+              <a:t>exemplo</a:t>
+            </a:r>
+            <a:endParaRPr lang="en-US" sz="2800" dirty="0"/>
+          </a:p>
+        </p:txBody>
+      </p:sp>
+      <p:sp>
+        <p:nvSpPr>
+          <p:cNvPr id="29" name="Rectangle 28">
+            <a:extLst>
+              <a:ext uri="{FF2B5EF4-FFF2-40B4-BE49-F238E27FC236}">
+                <a16:creationId xmlns:a16="http://schemas.microsoft.com/office/drawing/2014/main" id="{E87D435C-84AC-4E27-9CD3-0AAAF73EB28F}"/>
+              </a:ext>
+              <a:ext uri="{C183D7F6-B498-43B3-948B-1728B52AA6E4}">
+                <adec:decorative xmlns:adec="http://schemas.microsoft.com/office/drawing/2017/decorative" val="1"/>
+              </a:ext>
+            </a:extLst>
+          </p:cNvPr>
+          <p:cNvSpPr>
+            <a:spLocks noGrp="1" noRot="1" noChangeAspect="1" noMove="1" noResize="1" noEditPoints="1" noAdjustHandles="1" noChangeArrowheads="1" noChangeShapeType="1" noTextEdit="1"/>
+          </p:cNvSpPr>
+          <p:nvPr>
+            <p:extLst>
+              <p:ext uri="{386F3935-93C4-4BCD-93E2-E3B085C9AB24}">
+                <p16:designElem xmlns:p16="http://schemas.microsoft.com/office/powerpoint/2015/main" val="1"/>
+              </p:ext>
+            </p:extLst>
+          </p:nvPr>
+        </p:nvSpPr>
+        <p:spPr>
+          <a:xfrm>
+            <a:off x="6733032" y="640080"/>
+            <a:ext cx="4818888" cy="5261170"/>
+          </a:xfrm>
+          <a:prstGeom prst="rect">
+            <a:avLst/>
+          </a:prstGeom>
+          <a:noFill/>
+          <a:ln w="31750" cap="sq">
+            <a:solidFill>
+              <a:srgbClr val="FFFFFF"/>
+            </a:solidFill>
+            <a:miter lim="800000"/>
+          </a:ln>
+        </p:spPr>
+        <p:style>
+          <a:lnRef idx="2">
+            <a:schemeClr val="accent1">
+              <a:shade val="50000"/>
+            </a:schemeClr>
+          </a:lnRef>
+          <a:fillRef idx="1">
+            <a:schemeClr val="accent1"/>
+          </a:fillRef>
+          <a:effectRef idx="0">
+            <a:schemeClr val="accent1"/>
+          </a:effectRef>
+          <a:fontRef idx="minor">
+            <a:schemeClr val="lt1"/>
+          </a:fontRef>
+        </p:style>
+        <p:txBody>
+          <a:bodyPr rtlCol="0" anchor="ctr"/>
+          <a:lstStyle/>
+          <a:p>
+            <a:pPr algn="ctr"/>
+            <a:endParaRPr lang="en-US" dirty="0"/>
+          </a:p>
+        </p:txBody>
+      </p:sp>
+      <p:sp>
+        <p:nvSpPr>
+          <p:cNvPr id="31" name="Rectangle 30">
+            <a:extLst>
+              <a:ext uri="{FF2B5EF4-FFF2-40B4-BE49-F238E27FC236}">
+                <a16:creationId xmlns:a16="http://schemas.microsoft.com/office/drawing/2014/main" id="{EFA4C881-BF60-416C-A273-70541298EEB4}"/>
+              </a:ext>
+              <a:ext uri="{C183D7F6-B498-43B3-948B-1728B52AA6E4}">
+                <adec:decorative xmlns:adec="http://schemas.microsoft.com/office/drawing/2017/decorative" val="1"/>
+              </a:ext>
+            </a:extLst>
+          </p:cNvPr>
+          <p:cNvSpPr>
+            <a:spLocks noGrp="1" noRot="1" noChangeAspect="1" noMove="1" noResize="1" noEditPoints="1" noAdjustHandles="1" noChangeArrowheads="1" noChangeShapeType="1" noTextEdit="1"/>
+          </p:cNvSpPr>
+          <p:nvPr>
+            <p:extLst>
+              <p:ext uri="{386F3935-93C4-4BCD-93E2-E3B085C9AB24}">
+                <p16:designElem xmlns:p16="http://schemas.microsoft.com/office/powerpoint/2015/main" val="1"/>
+              </p:ext>
+            </p:extLst>
+          </p:nvPr>
+        </p:nvSpPr>
+        <p:spPr>
+          <a:xfrm>
+            <a:off x="6877586" y="806357"/>
+            <a:ext cx="4511266" cy="4928616"/>
+          </a:xfrm>
+          <a:prstGeom prst="rect">
+            <a:avLst/>
+          </a:prstGeom>
+          <a:solidFill>
+            <a:srgbClr val="FFFFFF"/>
+          </a:solidFill>
+          <a:ln>
+            <a:noFill/>
+          </a:ln>
+        </p:spPr>
+        <p:style>
+          <a:lnRef idx="2">
+            <a:schemeClr val="accent1">
+              <a:shade val="50000"/>
+            </a:schemeClr>
+          </a:lnRef>
+          <a:fillRef idx="1">
+            <a:schemeClr val="accent1"/>
+          </a:fillRef>
+          <a:effectRef idx="0">
+            <a:schemeClr val="accent1"/>
+          </a:effectRef>
+          <a:fontRef idx="minor">
+            <a:schemeClr val="lt1"/>
+          </a:fontRef>
+        </p:style>
+        <p:txBody>
+          <a:bodyPr rtlCol="0" anchor="ctr"/>
+          <a:lstStyle/>
+          <a:p>
+            <a:pPr algn="ctr"/>
+            <a:endParaRPr lang="en-US"/>
+          </a:p>
+        </p:txBody>
+      </p:sp>
+      <p:sp>
+        <p:nvSpPr>
+          <p:cNvPr id="8" name="Rectangle 2">
+            <a:extLst>
+              <a:ext uri="{FF2B5EF4-FFF2-40B4-BE49-F238E27FC236}">
+                <a16:creationId xmlns:a16="http://schemas.microsoft.com/office/drawing/2014/main" id="{4BC2167E-1B59-4796-A8F6-8A718FA37C48}"/>
+              </a:ext>
+            </a:extLst>
+          </p:cNvPr>
+          <p:cNvSpPr>
+            <a:spLocks noChangeArrowheads="1"/>
+          </p:cNvSpPr>
+          <p:nvPr/>
+        </p:nvSpPr>
+        <p:spPr bwMode="auto">
+          <a:xfrm>
+            <a:off x="7954308" y="1285508"/>
+            <a:ext cx="2376336" cy="3970318"/>
+          </a:xfrm>
+          <a:prstGeom prst="rect">
+            <a:avLst/>
+          </a:prstGeom>
+          <a:solidFill>
+            <a:srgbClr val="F0F0F0"/>
+          </a:solidFill>
+          <a:ln>
+            <a:noFill/>
+          </a:ln>
+          <a:effectLst/>
+          <a:extLst>
+            <a:ext uri="{91240B29-F687-4F45-9708-019B960494DF}">
+              <a14:hiddenLine xmlns:a14="http://schemas.microsoft.com/office/drawing/2010/main" w="9525">
+                <a:solidFill>
+                  <a:schemeClr val="tx1"/>
+                </a:solidFill>
+                <a:miter lim="800000"/>
+                <a:headEnd/>
+                <a:tailEnd/>
+              </a14:hiddenLine>
+            </a:ext>
+            <a:ext uri="{AF507438-7753-43E0-B8FC-AC1667EBCBE1}">
+              <a14:hiddenEffects xmlns:a14="http://schemas.microsoft.com/office/drawing/2010/main">
+                <a:effectLst>
+                  <a:outerShdw dist="35921" dir="2700000" algn="ctr" rotWithShape="0">
+                    <a:schemeClr val="bg2"/>
+                  </a:outerShdw>
+                </a:effectLst>
+              </a14:hiddenEffects>
+            </a:ext>
+          </a:extLst>
+        </p:spPr>
+        <p:txBody>
+          <a:bodyPr vert="horz" wrap="square" lIns="91440" tIns="45720" rIns="91440" bIns="45720" numCol="1" anchor="ctr" anchorCtr="0" compatLnSpc="1">
+            <a:prstTxWarp prst="textNoShape">
+              <a:avLst/>
+            </a:prstTxWarp>
+            <a:spAutoFit/>
+          </a:bodyPr>
+          <a:lstStyle/>
+          <a:p>
+            <a:pPr marL="0" marR="0" lvl="0" indent="0" algn="l" defTabSz="914400" rtl="0" eaLnBrk="0" fontAlgn="base" latinLnBrk="0" hangingPunct="0">
+              <a:lnSpc>
+                <a:spcPct val="100000"/>
+              </a:lnSpc>
+              <a:spcBef>
+                <a:spcPct val="0"/>
+              </a:spcBef>
+              <a:spcAft>
+                <a:spcPct val="0"/>
+              </a:spcAft>
+              <a:buClrTx/>
+              <a:buSzTx/>
+              <a:buFontTx/>
+              <a:buNone/>
+              <a:tabLst/>
+            </a:pPr>
+            <a:r>
+              <a:rPr kumimoji="0" lang="pt-BR" altLang="pt-BR" sz="2800" b="0" i="0" u="none" strike="noStrike" cap="none" normalizeH="0" baseline="0" dirty="0">
+                <a:ln>
+                  <a:noFill/>
+                </a:ln>
+                <a:solidFill>
+                  <a:srgbClr val="000000"/>
+                </a:solidFill>
+                <a:effectLst/>
+                <a:latin typeface="Microsoft JhengHei" panose="020B0604030504040204" pitchFamily="34" charset="-120"/>
+                <a:ea typeface="Microsoft JhengHei" panose="020B0604030504040204" pitchFamily="34" charset="-120"/>
+              </a:rPr>
+              <a:t>var x = 123; </a:t>
+            </a:r>
+          </a:p>
+          <a:p>
+            <a:pPr marL="0" marR="0" lvl="0" indent="0" algn="l" defTabSz="914400" rtl="0" eaLnBrk="0" fontAlgn="base" latinLnBrk="0" hangingPunct="0">
+              <a:lnSpc>
+                <a:spcPct val="100000"/>
+              </a:lnSpc>
+              <a:spcBef>
+                <a:spcPct val="0"/>
+              </a:spcBef>
+              <a:spcAft>
+                <a:spcPct val="0"/>
+              </a:spcAft>
+              <a:buClrTx/>
+              <a:buSzTx/>
+              <a:buFontTx/>
+              <a:buNone/>
+              <a:tabLst/>
+            </a:pPr>
+            <a:r>
+              <a:rPr kumimoji="0" lang="pt-BR" altLang="pt-BR" sz="2800" b="0" i="0" u="none" strike="noStrike" cap="none" normalizeH="0" baseline="0" dirty="0" err="1">
+                <a:ln>
+                  <a:noFill/>
+                </a:ln>
+                <a:solidFill>
+                  <a:srgbClr val="000000"/>
+                </a:solidFill>
+                <a:effectLst/>
+                <a:latin typeface="Microsoft JhengHei" panose="020B0604030504040204" pitchFamily="34" charset="-120"/>
+                <a:ea typeface="Microsoft JhengHei" panose="020B0604030504040204" pitchFamily="34" charset="-120"/>
+              </a:rPr>
+              <a:t>if</a:t>
+            </a:r>
+            <a:r>
+              <a:rPr kumimoji="0" lang="pt-BR" altLang="pt-BR" sz="2800" b="0" i="0" u="none" strike="noStrike" cap="none" normalizeH="0" baseline="0" dirty="0">
+                <a:ln>
+                  <a:noFill/>
+                </a:ln>
+                <a:solidFill>
+                  <a:srgbClr val="000000"/>
+                </a:solidFill>
+                <a:effectLst/>
+                <a:latin typeface="Microsoft JhengHei" panose="020B0604030504040204" pitchFamily="34" charset="-120"/>
+                <a:ea typeface="Microsoft JhengHei" panose="020B0604030504040204" pitchFamily="34" charset="-120"/>
+              </a:rPr>
+              <a:t> (y &gt;= 0) </a:t>
+            </a:r>
+          </a:p>
+          <a:p>
+            <a:pPr marL="0" marR="0" lvl="0" indent="0" algn="l" defTabSz="914400" rtl="0" eaLnBrk="0" fontAlgn="base" latinLnBrk="0" hangingPunct="0">
+              <a:lnSpc>
+                <a:spcPct val="100000"/>
+              </a:lnSpc>
+              <a:spcBef>
+                <a:spcPct val="0"/>
+              </a:spcBef>
+              <a:spcAft>
+                <a:spcPct val="0"/>
+              </a:spcAft>
+              <a:buClrTx/>
+              <a:buSzTx/>
+              <a:buFontTx/>
+              <a:buNone/>
+              <a:tabLst/>
+            </a:pPr>
+            <a:r>
+              <a:rPr kumimoji="0" lang="pt-BR" altLang="pt-BR" sz="2800" b="0" i="0" u="none" strike="noStrike" cap="none" normalizeH="0" baseline="0" dirty="0">
+                <a:ln>
+                  <a:noFill/>
+                </a:ln>
+                <a:solidFill>
+                  <a:srgbClr val="000000"/>
+                </a:solidFill>
+                <a:effectLst/>
+                <a:latin typeface="Microsoft JhengHei" panose="020B0604030504040204" pitchFamily="34" charset="-120"/>
+                <a:ea typeface="Microsoft JhengHei" panose="020B0604030504040204" pitchFamily="34" charset="-120"/>
+              </a:rPr>
+              <a:t>{ </a:t>
+            </a:r>
+          </a:p>
+          <a:p>
+            <a:pPr marL="0" marR="0" lvl="0" indent="0" algn="l" defTabSz="914400" rtl="0" eaLnBrk="0" fontAlgn="base" latinLnBrk="0" hangingPunct="0">
+              <a:lnSpc>
+                <a:spcPct val="100000"/>
+              </a:lnSpc>
+              <a:spcBef>
+                <a:spcPct val="0"/>
+              </a:spcBef>
+              <a:spcAft>
+                <a:spcPct val="0"/>
+              </a:spcAft>
+              <a:buClrTx/>
+              <a:buSzTx/>
+              <a:buFontTx/>
+              <a:buNone/>
+              <a:tabLst/>
+            </a:pPr>
+            <a:r>
+              <a:rPr lang="pt-BR" altLang="pt-BR" sz="2800" dirty="0">
+                <a:solidFill>
+                  <a:srgbClr val="000000"/>
+                </a:solidFill>
+                <a:latin typeface="Microsoft JhengHei" panose="020B0604030504040204" pitchFamily="34" charset="-120"/>
+                <a:ea typeface="Microsoft JhengHei" panose="020B0604030504040204" pitchFamily="34" charset="-120"/>
+              </a:rPr>
+              <a:t>    </a:t>
+            </a:r>
+            <a:r>
+              <a:rPr kumimoji="0" lang="pt-BR" altLang="pt-BR" sz="2800" b="0" i="0" u="none" strike="noStrike" cap="none" normalizeH="0" baseline="0" dirty="0">
+                <a:ln>
+                  <a:noFill/>
+                </a:ln>
+                <a:solidFill>
+                  <a:srgbClr val="000000"/>
+                </a:solidFill>
+                <a:effectLst/>
+                <a:latin typeface="Microsoft JhengHei" panose="020B0604030504040204" pitchFamily="34" charset="-120"/>
+                <a:ea typeface="Microsoft JhengHei" panose="020B0604030504040204" pitchFamily="34" charset="-120"/>
+              </a:rPr>
+              <a:t>x = y; </a:t>
+            </a:r>
+          </a:p>
+          <a:p>
+            <a:pPr marL="0" marR="0" lvl="0" indent="0" algn="l" defTabSz="914400" rtl="0" eaLnBrk="0" fontAlgn="base" latinLnBrk="0" hangingPunct="0">
+              <a:lnSpc>
+                <a:spcPct val="100000"/>
+              </a:lnSpc>
+              <a:spcBef>
+                <a:spcPct val="0"/>
+              </a:spcBef>
+              <a:spcAft>
+                <a:spcPct val="0"/>
+              </a:spcAft>
+              <a:buClrTx/>
+              <a:buSzTx/>
+              <a:buFontTx/>
+              <a:buNone/>
+              <a:tabLst/>
+            </a:pPr>
+            <a:r>
+              <a:rPr kumimoji="0" lang="pt-BR" altLang="pt-BR" sz="2800" b="0" i="0" u="none" strike="noStrike" cap="none" normalizeH="0" baseline="0" dirty="0">
+                <a:ln>
+                  <a:noFill/>
+                </a:ln>
+                <a:solidFill>
+                  <a:srgbClr val="000000"/>
+                </a:solidFill>
+                <a:effectLst/>
+                <a:latin typeface="Microsoft JhengHei" panose="020B0604030504040204" pitchFamily="34" charset="-120"/>
+                <a:ea typeface="Microsoft JhengHei" panose="020B0604030504040204" pitchFamily="34" charset="-120"/>
+              </a:rPr>
+              <a:t>} </a:t>
+            </a:r>
+          </a:p>
+          <a:p>
+            <a:pPr marL="0" marR="0" lvl="0" indent="0" algn="l" defTabSz="914400" rtl="0" eaLnBrk="0" fontAlgn="base" latinLnBrk="0" hangingPunct="0">
+              <a:lnSpc>
+                <a:spcPct val="100000"/>
+              </a:lnSpc>
+              <a:spcBef>
+                <a:spcPct val="0"/>
+              </a:spcBef>
+              <a:spcAft>
+                <a:spcPct val="0"/>
+              </a:spcAft>
+              <a:buClrTx/>
+              <a:buSzTx/>
+              <a:buFontTx/>
+              <a:buNone/>
+              <a:tabLst/>
+            </a:pPr>
+            <a:r>
+              <a:rPr kumimoji="0" lang="pt-BR" altLang="pt-BR" sz="2800" b="0" i="0" u="none" strike="noStrike" cap="none" normalizeH="0" baseline="0" dirty="0" err="1">
+                <a:ln>
+                  <a:noFill/>
+                </a:ln>
+                <a:solidFill>
+                  <a:srgbClr val="000000"/>
+                </a:solidFill>
+                <a:effectLst/>
+                <a:latin typeface="Microsoft JhengHei" panose="020B0604030504040204" pitchFamily="34" charset="-120"/>
+                <a:ea typeface="Microsoft JhengHei" panose="020B0604030504040204" pitchFamily="34" charset="-120"/>
+              </a:rPr>
+              <a:t>else</a:t>
+            </a:r>
+            <a:r>
+              <a:rPr kumimoji="0" lang="pt-BR" altLang="pt-BR" sz="2800" b="0" i="0" u="none" strike="noStrike" cap="none" normalizeH="0" baseline="0" dirty="0">
+                <a:ln>
+                  <a:noFill/>
+                </a:ln>
+                <a:solidFill>
+                  <a:srgbClr val="000000"/>
+                </a:solidFill>
+                <a:effectLst/>
+                <a:latin typeface="Microsoft JhengHei" panose="020B0604030504040204" pitchFamily="34" charset="-120"/>
+                <a:ea typeface="Microsoft JhengHei" panose="020B0604030504040204" pitchFamily="34" charset="-120"/>
+              </a:rPr>
+              <a:t> </a:t>
+            </a:r>
+          </a:p>
+          <a:p>
+            <a:pPr marL="0" marR="0" lvl="0" indent="0" algn="l" defTabSz="914400" rtl="0" eaLnBrk="0" fontAlgn="base" latinLnBrk="0" hangingPunct="0">
+              <a:lnSpc>
+                <a:spcPct val="100000"/>
+              </a:lnSpc>
+              <a:spcBef>
+                <a:spcPct val="0"/>
+              </a:spcBef>
+              <a:spcAft>
+                <a:spcPct val="0"/>
+              </a:spcAft>
+              <a:buClrTx/>
+              <a:buSzTx/>
+              <a:buFontTx/>
+              <a:buNone/>
+              <a:tabLst/>
+            </a:pPr>
+            <a:r>
+              <a:rPr kumimoji="0" lang="pt-BR" altLang="pt-BR" sz="2800" b="0" i="0" u="none" strike="noStrike" cap="none" normalizeH="0" baseline="0" dirty="0">
+                <a:ln>
+                  <a:noFill/>
+                </a:ln>
+                <a:solidFill>
+                  <a:srgbClr val="000000"/>
+                </a:solidFill>
+                <a:effectLst/>
+                <a:latin typeface="Microsoft JhengHei" panose="020B0604030504040204" pitchFamily="34" charset="-120"/>
+                <a:ea typeface="Microsoft JhengHei" panose="020B0604030504040204" pitchFamily="34" charset="-120"/>
+              </a:rPr>
+              <a:t>{ </a:t>
+            </a:r>
+          </a:p>
+          <a:p>
+            <a:pPr marL="0" marR="0" lvl="0" indent="0" algn="l" defTabSz="914400" rtl="0" eaLnBrk="0" fontAlgn="base" latinLnBrk="0" hangingPunct="0">
+              <a:lnSpc>
+                <a:spcPct val="100000"/>
+              </a:lnSpc>
+              <a:spcBef>
+                <a:spcPct val="0"/>
+              </a:spcBef>
+              <a:spcAft>
+                <a:spcPct val="0"/>
+              </a:spcAft>
+              <a:buClrTx/>
+              <a:buSzTx/>
+              <a:buFontTx/>
+              <a:buNone/>
+              <a:tabLst/>
+            </a:pPr>
+            <a:r>
+              <a:rPr lang="pt-BR" altLang="pt-BR" sz="2800" dirty="0">
+                <a:solidFill>
+                  <a:srgbClr val="000000"/>
+                </a:solidFill>
+                <a:latin typeface="Microsoft JhengHei" panose="020B0604030504040204" pitchFamily="34" charset="-120"/>
+                <a:ea typeface="Microsoft JhengHei" panose="020B0604030504040204" pitchFamily="34" charset="-120"/>
+              </a:rPr>
+              <a:t>    </a:t>
+            </a:r>
+            <a:r>
+              <a:rPr kumimoji="0" lang="pt-BR" altLang="pt-BR" sz="2800" b="0" i="0" u="none" strike="noStrike" cap="none" normalizeH="0" baseline="0" dirty="0">
+                <a:ln>
+                  <a:noFill/>
+                </a:ln>
+                <a:solidFill>
+                  <a:srgbClr val="000000"/>
+                </a:solidFill>
+                <a:effectLst/>
+                <a:latin typeface="Microsoft JhengHei" panose="020B0604030504040204" pitchFamily="34" charset="-120"/>
+                <a:ea typeface="Microsoft JhengHei" panose="020B0604030504040204" pitchFamily="34" charset="-120"/>
+              </a:rPr>
+              <a:t>x = -y; </a:t>
+            </a:r>
+          </a:p>
+          <a:p>
+            <a:pPr marL="0" marR="0" lvl="0" indent="0" algn="l" defTabSz="914400" rtl="0" eaLnBrk="0" fontAlgn="base" latinLnBrk="0" hangingPunct="0">
+              <a:lnSpc>
+                <a:spcPct val="100000"/>
+              </a:lnSpc>
+              <a:spcBef>
+                <a:spcPct val="0"/>
+              </a:spcBef>
+              <a:spcAft>
+                <a:spcPct val="0"/>
+              </a:spcAft>
+              <a:buClrTx/>
+              <a:buSzTx/>
+              <a:buFontTx/>
+              <a:buNone/>
+              <a:tabLst/>
+            </a:pPr>
+            <a:r>
+              <a:rPr kumimoji="0" lang="pt-BR" altLang="pt-BR" sz="2800" b="0" i="0" u="none" strike="noStrike" cap="none" normalizeH="0" baseline="0" dirty="0">
+                <a:ln>
+                  <a:noFill/>
+                </a:ln>
+                <a:solidFill>
+                  <a:srgbClr val="000000"/>
+                </a:solidFill>
+                <a:effectLst/>
+                <a:latin typeface="Microsoft JhengHei" panose="020B0604030504040204" pitchFamily="34" charset="-120"/>
+                <a:ea typeface="Microsoft JhengHei" panose="020B0604030504040204" pitchFamily="34" charset="-120"/>
+              </a:rPr>
+              <a:t>}</a:t>
+            </a:r>
+            <a:r>
+              <a:rPr kumimoji="0" lang="pt-BR" altLang="pt-BR" sz="2800" b="0" i="0" u="none" strike="noStrike" cap="none" normalizeH="0" baseline="0" dirty="0">
+                <a:ln>
+                  <a:noFill/>
+                </a:ln>
+                <a:solidFill>
+                  <a:schemeClr val="tx1"/>
+                </a:solidFill>
+                <a:effectLst/>
+                <a:latin typeface="Microsoft JhengHei" panose="020B0604030504040204" pitchFamily="34" charset="-120"/>
+                <a:ea typeface="Microsoft JhengHei" panose="020B0604030504040204" pitchFamily="34" charset="-120"/>
+              </a:rPr>
+              <a:t> </a:t>
+            </a:r>
+          </a:p>
+        </p:txBody>
+      </p:sp>
+      <p:sp>
+        <p:nvSpPr>
+          <p:cNvPr id="9" name="Retângulo: Cantos Arredondados 8">
+            <a:extLst>
+              <a:ext uri="{FF2B5EF4-FFF2-40B4-BE49-F238E27FC236}">
+                <a16:creationId xmlns:a16="http://schemas.microsoft.com/office/drawing/2014/main" id="{10B43B4B-B8B0-4648-8F7F-385F6B348A52}"/>
+              </a:ext>
+            </a:extLst>
+          </p:cNvPr>
+          <p:cNvSpPr/>
+          <p:nvPr/>
+        </p:nvSpPr>
+        <p:spPr>
+          <a:xfrm>
+            <a:off x="1647645" y="3053751"/>
+            <a:ext cx="2700068" cy="2786332"/>
+          </a:xfrm>
+          <a:prstGeom prst="roundRect">
+            <a:avLst>
+              <a:gd name="adj" fmla="val 4526"/>
+            </a:avLst>
+          </a:prstGeom>
+          <a:solidFill>
+            <a:schemeClr val="accent2">
+              <a:lumMod val="50000"/>
+            </a:schemeClr>
+          </a:solidFill>
+        </p:spPr>
+        <p:style>
+          <a:lnRef idx="2">
+            <a:schemeClr val="accent1">
+              <a:shade val="50000"/>
+            </a:schemeClr>
+          </a:lnRef>
+          <a:fillRef idx="1">
+            <a:schemeClr val="accent1"/>
+          </a:fillRef>
+          <a:effectRef idx="0">
+            <a:schemeClr val="accent1"/>
+          </a:effectRef>
+          <a:fontRef idx="minor">
+            <a:schemeClr val="lt1"/>
+          </a:fontRef>
+        </p:style>
+        <p:txBody>
+          <a:bodyPr rtlCol="0" anchor="ctr"/>
+          <a:lstStyle/>
+          <a:p>
+            <a:pPr marL="285750" indent="-285750">
+              <a:lnSpc>
+                <a:spcPct val="200000"/>
+              </a:lnSpc>
+              <a:buFont typeface="Arial" panose="020B0604020202020204" pitchFamily="34" charset="0"/>
+              <a:buChar char="•"/>
+            </a:pPr>
+            <a:r>
+              <a:rPr lang="pt-BR" dirty="0"/>
+              <a:t>3 LINHAS</a:t>
+            </a:r>
+          </a:p>
+          <a:p>
+            <a:pPr marL="285750" indent="-285750">
+              <a:lnSpc>
+                <a:spcPct val="200000"/>
+              </a:lnSpc>
+              <a:buFont typeface="Arial" panose="020B0604020202020204" pitchFamily="34" charset="0"/>
+              <a:buChar char="•"/>
+            </a:pPr>
+            <a:r>
+              <a:rPr lang="pt-BR" dirty="0"/>
+              <a:t>2 BRANCHS</a:t>
+            </a:r>
+          </a:p>
+          <a:p>
+            <a:pPr marL="285750" indent="-285750">
+              <a:lnSpc>
+                <a:spcPct val="200000"/>
+              </a:lnSpc>
+              <a:buFont typeface="Arial" panose="020B0604020202020204" pitchFamily="34" charset="0"/>
+              <a:buChar char="•"/>
+            </a:pPr>
+            <a:r>
+              <a:rPr lang="pt-BR" dirty="0"/>
+              <a:t>1 STATEMENTS</a:t>
+            </a:r>
+          </a:p>
+          <a:p>
+            <a:pPr marL="285750" indent="-285750">
+              <a:lnSpc>
+                <a:spcPct val="200000"/>
+              </a:lnSpc>
+              <a:buFont typeface="Arial" panose="020B0604020202020204" pitchFamily="34" charset="0"/>
+              <a:buChar char="•"/>
+            </a:pPr>
+            <a:r>
+              <a:rPr lang="pt-BR" dirty="0"/>
+              <a:t>0 FUNCTIONS</a:t>
+            </a:r>
+          </a:p>
+        </p:txBody>
+      </p:sp>
+    </p:spTree>
+    <p:extLst>
+      <p:ext uri="{BB962C8B-B14F-4D97-AF65-F5344CB8AC3E}">
+        <p14:creationId xmlns:p14="http://schemas.microsoft.com/office/powerpoint/2010/main" val="388423717"/>
+      </p:ext>
+    </p:extLst>
+  </p:cSld>
+  <p:clrMapOvr>
+    <a:masterClrMapping/>
+  </p:clrMapOvr>
+</p:sld>
+</file>
+
+<file path=ppt/slides/slide13.xml><?xml version="1.0" encoding="utf-8"?>
 <p:sld xmlns:a="http://schemas.openxmlformats.org/drawingml/2006/main" xmlns:r="http://schemas.openxmlformats.org/officeDocument/2006/relationships" xmlns:p="http://schemas.openxmlformats.org/presentationml/2006/main">
   <p:cSld>
     <p:spTree>
@@ -5448,7 +6238,7 @@
         <p:spPr>
           <a:xfrm>
             <a:off x="804672" y="2858703"/>
-            <a:ext cx="4475892" cy="3042547"/>
+            <a:ext cx="4475892" cy="1376867"/>
           </a:xfrm>
           <a:prstGeom prst="rect">
             <a:avLst/>

</xml_diff>